<commit_message>
ppt updated and report in new format
</commit_message>
<xml_diff>
--- a/branch1/ProjectPresentation.pptx
+++ b/branch1/ProjectPresentation.pptx
@@ -8,11 +8,13 @@
     <p:sldId id="256" r:id="rId2"/>
     <p:sldId id="257" r:id="rId3"/>
     <p:sldId id="259" r:id="rId4"/>
-    <p:sldId id="260" r:id="rId5"/>
-    <p:sldId id="261" r:id="rId6"/>
-    <p:sldId id="262" r:id="rId7"/>
-    <p:sldId id="263" r:id="rId8"/>
-    <p:sldId id="258" r:id="rId9"/>
+    <p:sldId id="264" r:id="rId5"/>
+    <p:sldId id="265" r:id="rId6"/>
+    <p:sldId id="260" r:id="rId7"/>
+    <p:sldId id="261" r:id="rId8"/>
+    <p:sldId id="262" r:id="rId9"/>
+    <p:sldId id="263" r:id="rId10"/>
+    <p:sldId id="258" r:id="rId11"/>
   </p:sldIdLst>
   <p:sldSz cx="12192000" cy="6858000"/>
   <p:notesSz cx="6858000" cy="9144000"/>
@@ -111,6 +113,11 @@
       </a:defRPr>
     </a:lvl9pPr>
   </p:defaultTextStyle>
+  <p:extLst>
+    <p:ext uri="{EFAFB233-063F-42B5-8137-9DF3F51BA10A}">
+      <p15:sldGuideLst xmlns:p15="http://schemas.microsoft.com/office/powerpoint/2012/main"/>
+    </p:ext>
+  </p:extLst>
 </p:presentation>
 </file>
 
@@ -261,7 +268,7 @@
           <a:p>
             <a:fld id="{9D329FF2-7130-4BED-B2B2-9E8A91294405}" type="datetimeFigureOut">
               <a:rPr lang="en-US" smtClean="0"/>
-              <a:t>7/23/2019</a:t>
+              <a:t>7/24/2019</a:t>
             </a:fld>
             <a:endParaRPr lang="en-US"/>
           </a:p>
@@ -459,7 +466,7 @@
           <a:p>
             <a:fld id="{9D329FF2-7130-4BED-B2B2-9E8A91294405}" type="datetimeFigureOut">
               <a:rPr lang="en-US" smtClean="0"/>
-              <a:t>7/23/2019</a:t>
+              <a:t>7/24/2019</a:t>
             </a:fld>
             <a:endParaRPr lang="en-US"/>
           </a:p>
@@ -667,7 +674,7 @@
           <a:p>
             <a:fld id="{9D329FF2-7130-4BED-B2B2-9E8A91294405}" type="datetimeFigureOut">
               <a:rPr lang="en-US" smtClean="0"/>
-              <a:t>7/23/2019</a:t>
+              <a:t>7/24/2019</a:t>
             </a:fld>
             <a:endParaRPr lang="en-US"/>
           </a:p>
@@ -865,7 +872,7 @@
           <a:p>
             <a:fld id="{9D329FF2-7130-4BED-B2B2-9E8A91294405}" type="datetimeFigureOut">
               <a:rPr lang="en-US" smtClean="0"/>
-              <a:t>7/23/2019</a:t>
+              <a:t>7/24/2019</a:t>
             </a:fld>
             <a:endParaRPr lang="en-US"/>
           </a:p>
@@ -1140,7 +1147,7 @@
           <a:p>
             <a:fld id="{9D329FF2-7130-4BED-B2B2-9E8A91294405}" type="datetimeFigureOut">
               <a:rPr lang="en-US" smtClean="0"/>
-              <a:t>7/23/2019</a:t>
+              <a:t>7/24/2019</a:t>
             </a:fld>
             <a:endParaRPr lang="en-US"/>
           </a:p>
@@ -1405,7 +1412,7 @@
           <a:p>
             <a:fld id="{9D329FF2-7130-4BED-B2B2-9E8A91294405}" type="datetimeFigureOut">
               <a:rPr lang="en-US" smtClean="0"/>
-              <a:t>7/23/2019</a:t>
+              <a:t>7/24/2019</a:t>
             </a:fld>
             <a:endParaRPr lang="en-US"/>
           </a:p>
@@ -1817,7 +1824,7 @@
           <a:p>
             <a:fld id="{9D329FF2-7130-4BED-B2B2-9E8A91294405}" type="datetimeFigureOut">
               <a:rPr lang="en-US" smtClean="0"/>
-              <a:t>7/23/2019</a:t>
+              <a:t>7/24/2019</a:t>
             </a:fld>
             <a:endParaRPr lang="en-US"/>
           </a:p>
@@ -1958,7 +1965,7 @@
           <a:p>
             <a:fld id="{9D329FF2-7130-4BED-B2B2-9E8A91294405}" type="datetimeFigureOut">
               <a:rPr lang="en-US" smtClean="0"/>
-              <a:t>7/23/2019</a:t>
+              <a:t>7/24/2019</a:t>
             </a:fld>
             <a:endParaRPr lang="en-US"/>
           </a:p>
@@ -2071,7 +2078,7 @@
           <a:p>
             <a:fld id="{9D329FF2-7130-4BED-B2B2-9E8A91294405}" type="datetimeFigureOut">
               <a:rPr lang="en-US" smtClean="0"/>
-              <a:t>7/23/2019</a:t>
+              <a:t>7/24/2019</a:t>
             </a:fld>
             <a:endParaRPr lang="en-US"/>
           </a:p>
@@ -2382,7 +2389,7 @@
           <a:p>
             <a:fld id="{9D329FF2-7130-4BED-B2B2-9E8A91294405}" type="datetimeFigureOut">
               <a:rPr lang="en-US" smtClean="0"/>
-              <a:t>7/23/2019</a:t>
+              <a:t>7/24/2019</a:t>
             </a:fld>
             <a:endParaRPr lang="en-US"/>
           </a:p>
@@ -2670,7 +2677,7 @@
           <a:p>
             <a:fld id="{9D329FF2-7130-4BED-B2B2-9E8A91294405}" type="datetimeFigureOut">
               <a:rPr lang="en-US" smtClean="0"/>
-              <a:t>7/23/2019</a:t>
+              <a:t>7/24/2019</a:t>
             </a:fld>
             <a:endParaRPr lang="en-US"/>
           </a:p>
@@ -2911,7 +2918,7 @@
           <a:p>
             <a:fld id="{9D329FF2-7130-4BED-B2B2-9E8A91294405}" type="datetimeFigureOut">
               <a:rPr lang="en-US" smtClean="0"/>
-              <a:t>7/23/2019</a:t>
+              <a:t>7/24/2019</a:t>
             </a:fld>
             <a:endParaRPr lang="en-US"/>
           </a:p>
@@ -3420,6 +3427,212 @@
 </p:sld>
 </file>
 
+<file path=ppt/slides/slide10.xml><?xml version="1.0" encoding="utf-8"?>
+<p:sld xmlns:a="http://schemas.openxmlformats.org/drawingml/2006/main" xmlns:r="http://schemas.openxmlformats.org/officeDocument/2006/relationships" xmlns:p="http://schemas.openxmlformats.org/presentationml/2006/main">
+  <p:cSld>
+    <p:spTree>
+      <p:nvGrpSpPr>
+        <p:cNvPr id="1" name=""/>
+        <p:cNvGrpSpPr/>
+        <p:nvPr/>
+      </p:nvGrpSpPr>
+      <p:grpSpPr>
+        <a:xfrm>
+          <a:off x="0" y="0"/>
+          <a:ext cx="0" cy="0"/>
+          <a:chOff x="0" y="0"/>
+          <a:chExt cx="0" cy="0"/>
+        </a:xfrm>
+      </p:grpSpPr>
+      <p:sp>
+        <p:nvSpPr>
+          <p:cNvPr id="2" name="Title 1">
+            <a:extLst>
+              <a:ext uri="{FF2B5EF4-FFF2-40B4-BE49-F238E27FC236}">
+                <a16:creationId xmlns:a16="http://schemas.microsoft.com/office/drawing/2014/main" id="{A2F36CEB-8222-4660-B66A-DFA2212BCEAC}"/>
+              </a:ext>
+            </a:extLst>
+          </p:cNvPr>
+          <p:cNvSpPr>
+            <a:spLocks noGrp="1"/>
+          </p:cNvSpPr>
+          <p:nvPr>
+            <p:ph type="title"/>
+          </p:nvPr>
+        </p:nvSpPr>
+        <p:spPr/>
+        <p:txBody>
+          <a:bodyPr/>
+          <a:lstStyle/>
+          <a:p>
+            <a:r>
+              <a:rPr lang="en-US" dirty="0"/>
+              <a:t>References</a:t>
+            </a:r>
+          </a:p>
+        </p:txBody>
+      </p:sp>
+      <p:sp>
+        <p:nvSpPr>
+          <p:cNvPr id="3" name="Content Placeholder 2">
+            <a:extLst>
+              <a:ext uri="{FF2B5EF4-FFF2-40B4-BE49-F238E27FC236}">
+                <a16:creationId xmlns:a16="http://schemas.microsoft.com/office/drawing/2014/main" id="{584EB1ED-BE34-414A-BBB6-1EB858E56703}"/>
+              </a:ext>
+            </a:extLst>
+          </p:cNvPr>
+          <p:cNvSpPr>
+            <a:spLocks noGrp="1"/>
+          </p:cNvSpPr>
+          <p:nvPr>
+            <p:ph idx="1"/>
+          </p:nvPr>
+        </p:nvSpPr>
+        <p:spPr/>
+        <p:txBody>
+          <a:bodyPr/>
+          <a:lstStyle/>
+          <a:p>
+            <a:r>
+              <a:rPr lang="en-US" sz="1400" dirty="0"/>
+              <a:t>IATA Forecast Predicts 8.2 billion Air Travelers in 2037 </a:t>
+            </a:r>
+            <a:r>
+              <a:rPr lang="en-US" sz="1400" dirty="0">
+                <a:hlinkClick r:id="rId2"/>
+              </a:rPr>
+              <a:t>https://www.iata.org/pressroom/pr/Pages/2018-10-24-02.aspx</a:t>
+            </a:r>
+            <a:r>
+              <a:rPr lang="en-US" sz="1400" dirty="0"/>
+              <a:t> </a:t>
+            </a:r>
+            <a:r>
+              <a:rPr lang="en-US" sz="1400" dirty="0">
+                <a:hlinkClick r:id="rId3" action="ppaction://hlinksldjump"/>
+              </a:rPr>
+              <a:t>[1]</a:t>
+            </a:r>
+            <a:endParaRPr lang="en-US" sz="1400" dirty="0"/>
+          </a:p>
+          <a:p>
+            <a:r>
+              <a:rPr lang="en-US" sz="1400" dirty="0"/>
+              <a:t>Annual U.S. Impact of Flight Delays (NEXTOR report) </a:t>
+            </a:r>
+            <a:r>
+              <a:rPr lang="en-US" sz="1400" dirty="0">
+                <a:hlinkClick r:id="rId4"/>
+              </a:rPr>
+              <a:t>http://airlines.org/data/annual-u-s-impact-of-flight-delays-nextor-report/</a:t>
+            </a:r>
+            <a:r>
+              <a:rPr lang="en-US" sz="1400" dirty="0"/>
+              <a:t> </a:t>
+            </a:r>
+            <a:r>
+              <a:rPr lang="en-US" sz="1400" dirty="0">
+                <a:hlinkClick r:id="rId3" action="ppaction://hlinksldjump"/>
+              </a:rPr>
+              <a:t>[2]</a:t>
+            </a:r>
+            <a:endParaRPr lang="en-US" sz="1400" dirty="0"/>
+          </a:p>
+          <a:p>
+            <a:r>
+              <a:rPr lang="en-US" sz="1400" dirty="0"/>
+              <a:t>Holidaymakers 'waste 16 days waiting in airports over lifetime </a:t>
+            </a:r>
+            <a:r>
+              <a:rPr lang="en-US" sz="1400" dirty="0">
+                <a:hlinkClick r:id="rId5"/>
+              </a:rPr>
+              <a:t>https://www.telegraph.co.uk/travel/travelnews/7546209/Holidaymakers-waste-16-days-waiting-in-airports-over-lifetime.html [3</a:t>
+            </a:r>
+            <a:r>
+              <a:rPr lang="en-US" sz="1400" dirty="0">
+                <a:hlinkClick r:id="rId3" action="ppaction://hlinksldjump"/>
+              </a:rPr>
+              <a:t>]</a:t>
+            </a:r>
+            <a:endParaRPr lang="en-US" sz="1400" dirty="0"/>
+          </a:p>
+          <a:p>
+            <a:r>
+              <a:rPr lang="en-US" sz="1400" dirty="0" err="1"/>
+              <a:t>Flightaware</a:t>
+            </a:r>
+            <a:r>
+              <a:rPr lang="en-US" sz="1400" dirty="0"/>
+              <a:t> </a:t>
+            </a:r>
+            <a:r>
+              <a:rPr lang="en-US" sz="1400" dirty="0" err="1"/>
+              <a:t>MiseryMap</a:t>
+            </a:r>
+            <a:r>
+              <a:rPr lang="en-US" sz="1400" dirty="0"/>
+              <a:t> </a:t>
+            </a:r>
+            <a:r>
+              <a:rPr lang="en-US" sz="1400" dirty="0">
+                <a:hlinkClick r:id="rId6"/>
+              </a:rPr>
+              <a:t>https://flightaware.com/miserymap/</a:t>
+            </a:r>
+            <a:r>
+              <a:rPr lang="en-US" sz="1400" dirty="0"/>
+              <a:t> </a:t>
+            </a:r>
+            <a:r>
+              <a:rPr lang="en-US" sz="1400" dirty="0">
+                <a:hlinkClick r:id="rId7" action="ppaction://hlinksldjump"/>
+              </a:rPr>
+              <a:t>[4]</a:t>
+            </a:r>
+            <a:endParaRPr lang="en-US" sz="1400" dirty="0"/>
+          </a:p>
+          <a:p>
+            <a:r>
+              <a:rPr lang="en-US" sz="1400" dirty="0"/>
+              <a:t>Flight Delay Information - Air Traffic Control System Command Center </a:t>
+            </a:r>
+            <a:r>
+              <a:rPr lang="en-US" sz="1400" dirty="0">
+                <a:hlinkClick r:id="rId8"/>
+              </a:rPr>
+              <a:t>https://www.fly.faa.gov/flyfaa/usmap.jsp</a:t>
+            </a:r>
+            <a:r>
+              <a:rPr lang="en-US" sz="1400" dirty="0"/>
+              <a:t> </a:t>
+            </a:r>
+            <a:r>
+              <a:rPr lang="en-US" sz="1400" dirty="0">
+                <a:hlinkClick r:id="rId9" action="ppaction://hlinksldjump"/>
+              </a:rPr>
+              <a:t>[5]</a:t>
+            </a:r>
+            <a:endParaRPr lang="en-US" sz="1400" dirty="0"/>
+          </a:p>
+          <a:p>
+            <a:endParaRPr lang="en-US" dirty="0"/>
+          </a:p>
+        </p:txBody>
+      </p:sp>
+    </p:spTree>
+    <p:extLst>
+      <p:ext uri="{BB962C8B-B14F-4D97-AF65-F5344CB8AC3E}">
+        <p14:creationId xmlns:p14="http://schemas.microsoft.com/office/powerpoint/2010/main" val="3998683983"/>
+      </p:ext>
+    </p:extLst>
+  </p:cSld>
+  <p:clrMapOvr>
+    <a:masterClrMapping/>
+  </p:clrMapOvr>
+</p:sld>
+</file>
+
 <file path=ppt/slides/slide2.xml><?xml version="1.0" encoding="utf-8"?>
 <p:sld xmlns:a="http://schemas.openxmlformats.org/drawingml/2006/main" xmlns:r="http://schemas.openxmlformats.org/officeDocument/2006/relationships" xmlns:p="http://schemas.openxmlformats.org/presentationml/2006/main">
   <p:cSld>
@@ -3563,9 +3776,10 @@
             </a:r>
           </a:p>
           <a:p>
-            <a:r>
-              <a:rPr lang="en-US" sz="1800" dirty="0"/>
-              <a:t>It would have really helped if we can analyze and visualize the flight data to get a better understanding of Airlines and Airports to make in informed choice before finalizing our travel plans!</a:t>
+            <a:pPr lvl="1"/>
+            <a:r>
+              <a:rPr lang="en-US" sz="1400" dirty="0"/>
+              <a:t>It would have really helped if we can analyze and visualize the flight data to get a better understanding of Airlines and Airports to make an informed choice before finalizing our travel plans!</a:t>
             </a:r>
           </a:p>
         </p:txBody>
@@ -3653,19 +3867,25 @@
           <a:p>
             <a:r>
               <a:rPr lang="en-US" sz="1800" dirty="0"/>
-              <a:t>There are very few websites and portals that gives preference to airlines and airports on punctuality.</a:t>
+              <a:t>There are a handful websites that provide an analysis of punctuality of airlines and airports.</a:t>
             </a:r>
           </a:p>
           <a:p>
             <a:r>
               <a:rPr lang="en-US" sz="1800" dirty="0"/>
-              <a:t>The problem is that there is no concrete basis and data source that can support their claim.</a:t>
+              <a:t>Even the ones that are available are either on current data (real time or past few hours) and not an analysis on historical data for a proper analysis of trends or behavior.</a:t>
             </a:r>
           </a:p>
           <a:p>
             <a:r>
               <a:rPr lang="en-US" sz="1800" dirty="0"/>
-              <a:t>There is no effective visualization that can help us understand the data and help us making decision.</a:t>
+              <a:t>There is not enough detail available that can help us in making decision for future travels from airports and airlines based on past trends and airlines behavior.</a:t>
+            </a:r>
+          </a:p>
+          <a:p>
+            <a:r>
+              <a:rPr lang="en-US" sz="1800" dirty="0"/>
+              <a:t>Even though a flight may show on time on these current data visualizations, there is a possibility that the flights of an airline are regularly late due to unavailability of aircrafts or pilots. We may want to avoid taking that Airline</a:t>
             </a:r>
           </a:p>
         </p:txBody>
@@ -3705,7 +3925,7 @@
           <p:cNvPr id="2" name="Title 1">
             <a:extLst>
               <a:ext uri="{FF2B5EF4-FFF2-40B4-BE49-F238E27FC236}">
-                <a16:creationId xmlns:a16="http://schemas.microsoft.com/office/drawing/2014/main" id="{06B9D043-BB24-4054-9A3D-590DC478D9B8}"/>
+                <a16:creationId xmlns:a16="http://schemas.microsoft.com/office/drawing/2014/main" id="{E5AB24C3-E289-489C-9A25-15122DE49C3B}"/>
               </a:ext>
             </a:extLst>
           </p:cNvPr>
@@ -3716,47 +3936,112 @@
             <p:ph type="title"/>
           </p:nvPr>
         </p:nvSpPr>
-        <p:spPr/>
-        <p:txBody>
-          <a:bodyPr/>
-          <a:lstStyle/>
-          <a:p>
-            <a:r>
-              <a:rPr lang="en-US" dirty="0"/>
-              <a:t>Objective</a:t>
-            </a:r>
-          </a:p>
-        </p:txBody>
-      </p:sp>
-      <p:sp>
-        <p:nvSpPr>
-          <p:cNvPr id="3" name="Content Placeholder 2">
-            <a:extLst>
-              <a:ext uri="{FF2B5EF4-FFF2-40B4-BE49-F238E27FC236}">
-                <a16:creationId xmlns:a16="http://schemas.microsoft.com/office/drawing/2014/main" id="{BDC88E67-ADE4-4701-A462-6DAA60BAF5AF}"/>
-              </a:ext>
-            </a:extLst>
-          </p:cNvPr>
-          <p:cNvSpPr>
-            <a:spLocks noGrp="1"/>
-          </p:cNvSpPr>
+        <p:spPr>
+          <a:xfrm>
+            <a:off x="838200" y="365125"/>
+            <a:ext cx="10515600" cy="1325563"/>
+          </a:xfrm>
+        </p:spPr>
+        <p:txBody>
+          <a:bodyPr>
+            <a:normAutofit/>
+          </a:bodyPr>
+          <a:lstStyle/>
+          <a:p>
+            <a:r>
+              <a:rPr lang="en-US" sz="1800" dirty="0">
+                <a:latin typeface="+mn-lt"/>
+                <a:ea typeface="+mn-ea"/>
+                <a:cs typeface="+mn-cs"/>
+              </a:rPr>
+              <a:t>Flight aware flight delay visualization, </a:t>
+            </a:r>
+            <a:r>
+              <a:rPr lang="en-US" sz="1800" dirty="0" err="1">
+                <a:latin typeface="+mn-lt"/>
+                <a:ea typeface="+mn-ea"/>
+                <a:cs typeface="+mn-cs"/>
+              </a:rPr>
+              <a:t>MiseryMap</a:t>
+            </a:r>
+            <a:r>
+              <a:rPr lang="en-US" sz="1800" dirty="0">
+                <a:latin typeface="+mn-lt"/>
+                <a:ea typeface="+mn-ea"/>
+                <a:cs typeface="+mn-cs"/>
+              </a:rPr>
+              <a:t> 2019. </a:t>
+            </a:r>
+            <a:r>
+              <a:rPr lang="en-US" sz="1400" dirty="0">
+                <a:latin typeface="+mn-lt"/>
+                <a:ea typeface="+mn-ea"/>
+                <a:cs typeface="+mn-cs"/>
+                <a:hlinkClick r:id="rId2" action="ppaction://hlinksldjump"/>
+              </a:rPr>
+              <a:t>[4]</a:t>
+            </a:r>
+            <a:br>
+              <a:rPr lang="en-US" sz="1400" dirty="0">
+                <a:latin typeface="+mn-lt"/>
+                <a:ea typeface="+mn-ea"/>
+                <a:cs typeface="+mn-cs"/>
+              </a:rPr>
+            </a:br>
+            <a:br>
+              <a:rPr lang="en-US" sz="1400" dirty="0">
+                <a:latin typeface="+mn-lt"/>
+                <a:ea typeface="+mn-ea"/>
+                <a:cs typeface="+mn-cs"/>
+              </a:rPr>
+            </a:br>
+            <a:r>
+              <a:rPr lang="en-US" sz="1400" dirty="0">
+                <a:latin typeface="+mn-lt"/>
+                <a:ea typeface="+mn-ea"/>
+                <a:cs typeface="+mn-cs"/>
+              </a:rPr>
+              <a:t>This visualization shows some big Airports only, no data available for Airlines and no option to choose other airports e.g. Indianapolis , Cincinnati etc. More importantly , this is based on current data (last few hours) and not an analysis on a historical dataset.</a:t>
+            </a:r>
+          </a:p>
+        </p:txBody>
+      </p:sp>
+      <p:pic>
+        <p:nvPicPr>
+          <p:cNvPr id="4" name="Content Placeholder 3">
+            <a:extLst>
+              <a:ext uri="{FF2B5EF4-FFF2-40B4-BE49-F238E27FC236}">
+                <a16:creationId xmlns:a16="http://schemas.microsoft.com/office/drawing/2014/main" id="{99E3FED9-29C0-47AD-ACE9-3586419B9F9E}"/>
+              </a:ext>
+            </a:extLst>
+          </p:cNvPr>
+          <p:cNvPicPr>
+            <a:picLocks noGrp="1" noChangeAspect="1"/>
+          </p:cNvPicPr>
           <p:nvPr>
             <p:ph idx="1"/>
           </p:nvPr>
-        </p:nvSpPr>
-        <p:spPr/>
-        <p:txBody>
-          <a:bodyPr/>
-          <a:lstStyle/>
-          <a:p>
-            <a:endParaRPr lang="en-US" dirty="0"/>
-          </a:p>
-        </p:txBody>
-      </p:sp>
+        </p:nvPicPr>
+        <p:blipFill>
+          <a:blip r:embed="rId3"/>
+          <a:stretch>
+            <a:fillRect/>
+          </a:stretch>
+        </p:blipFill>
+        <p:spPr>
+          <a:xfrm>
+            <a:off x="1343815" y="1825625"/>
+            <a:ext cx="9504370" cy="4351338"/>
+          </a:xfrm>
+          <a:prstGeom prst="rect">
+            <a:avLst/>
+          </a:prstGeom>
+        </p:spPr>
+      </p:pic>
     </p:spTree>
     <p:extLst>
       <p:ext uri="{BB962C8B-B14F-4D97-AF65-F5344CB8AC3E}">
-        <p14:creationId xmlns:p14="http://schemas.microsoft.com/office/powerpoint/2010/main" val="79547047"/>
+        <p14:creationId xmlns:p14="http://schemas.microsoft.com/office/powerpoint/2010/main" val="2863180571"/>
       </p:ext>
     </p:extLst>
   </p:cSld>
@@ -3788,7 +4073,7 @@
           <p:cNvPr id="2" name="Title 1">
             <a:extLst>
               <a:ext uri="{FF2B5EF4-FFF2-40B4-BE49-F238E27FC236}">
-                <a16:creationId xmlns:a16="http://schemas.microsoft.com/office/drawing/2014/main" id="{6953608A-7531-4E0C-A2B3-4F02DC33E0BC}"/>
+                <a16:creationId xmlns:a16="http://schemas.microsoft.com/office/drawing/2014/main" id="{DDCFB5B2-209D-4456-A885-962665935209}"/>
               </a:ext>
             </a:extLst>
           </p:cNvPr>
@@ -3801,45 +4086,112 @@
         </p:nvSpPr>
         <p:spPr/>
         <p:txBody>
-          <a:bodyPr/>
-          <a:lstStyle/>
-          <a:p>
-            <a:r>
-              <a:rPr lang="en-US" dirty="0"/>
-              <a:t>Results</a:t>
-            </a:r>
-          </a:p>
-        </p:txBody>
-      </p:sp>
-      <p:sp>
-        <p:nvSpPr>
-          <p:cNvPr id="3" name="Content Placeholder 2">
-            <a:extLst>
-              <a:ext uri="{FF2B5EF4-FFF2-40B4-BE49-F238E27FC236}">
-                <a16:creationId xmlns:a16="http://schemas.microsoft.com/office/drawing/2014/main" id="{BDDAF977-B0AC-4872-A4EB-B595C2AFF5C8}"/>
-              </a:ext>
-            </a:extLst>
-          </p:cNvPr>
-          <p:cNvSpPr>
-            <a:spLocks noGrp="1"/>
-          </p:cNvSpPr>
+          <a:bodyPr>
+            <a:normAutofit/>
+          </a:bodyPr>
+          <a:lstStyle/>
+          <a:p>
+            <a:r>
+              <a:rPr lang="en-US" sz="1800" dirty="0">
+                <a:solidFill>
+                  <a:prstClr val="black"/>
+                </a:solidFill>
+                <a:latin typeface="Calibri" panose="020F0502020204030204"/>
+              </a:rPr>
+              <a:t>Flight Delay Information - Air Traffic Control System Command Center, 2019. </a:t>
+            </a:r>
+            <a:r>
+              <a:rPr lang="en-US" sz="1400" dirty="0">
+                <a:solidFill>
+                  <a:prstClr val="black"/>
+                </a:solidFill>
+                <a:latin typeface="Calibri" panose="020F0502020204030204"/>
+                <a:hlinkClick r:id="rId2" action="ppaction://hlinksldjump"/>
+              </a:rPr>
+              <a:t>[5]</a:t>
+            </a:r>
+            <a:br>
+              <a:rPr lang="en-US" sz="1400" dirty="0">
+                <a:solidFill>
+                  <a:prstClr val="black"/>
+                </a:solidFill>
+                <a:latin typeface="Calibri" panose="020F0502020204030204"/>
+              </a:rPr>
+            </a:br>
+            <a:br>
+              <a:rPr lang="en-US" sz="1400" dirty="0">
+                <a:solidFill>
+                  <a:prstClr val="black"/>
+                </a:solidFill>
+                <a:latin typeface="Calibri" panose="020F0502020204030204"/>
+              </a:rPr>
+            </a:br>
+            <a:r>
+              <a:rPr lang="en-US" sz="1400" dirty="0">
+                <a:solidFill>
+                  <a:prstClr val="black"/>
+                </a:solidFill>
+                <a:latin typeface="Calibri" panose="020F0502020204030204"/>
+              </a:rPr>
+              <a:t>This visualization also shows airports and its also based on current data (last few hours) and not an analysis on a historical dataset.</a:t>
+            </a:r>
+            <a:br>
+              <a:rPr lang="en-US" sz="1400" dirty="0">
+                <a:solidFill>
+                  <a:prstClr val="black"/>
+                </a:solidFill>
+                <a:latin typeface="Calibri" panose="020F0502020204030204"/>
+              </a:rPr>
+            </a:br>
+            <a:r>
+              <a:rPr lang="en-US" sz="1400" dirty="0">
+                <a:solidFill>
+                  <a:prstClr val="black"/>
+                </a:solidFill>
+                <a:latin typeface="Calibri" panose="020F0502020204030204"/>
+              </a:rPr>
+              <a:t>Its interactive and lets user select airport or flights and provides current situation for that.</a:t>
+            </a:r>
+            <a:endParaRPr lang="en-US" dirty="0"/>
+          </a:p>
+        </p:txBody>
+      </p:sp>
+      <p:pic>
+        <p:nvPicPr>
+          <p:cNvPr id="4" name="Content Placeholder 3">
+            <a:extLst>
+              <a:ext uri="{FF2B5EF4-FFF2-40B4-BE49-F238E27FC236}">
+                <a16:creationId xmlns:a16="http://schemas.microsoft.com/office/drawing/2014/main" id="{036937CB-D5DD-42C2-932E-64D7067BC828}"/>
+              </a:ext>
+            </a:extLst>
+          </p:cNvPr>
+          <p:cNvPicPr>
+            <a:picLocks noGrp="1" noChangeAspect="1"/>
+          </p:cNvPicPr>
           <p:nvPr>
             <p:ph idx="1"/>
           </p:nvPr>
-        </p:nvSpPr>
-        <p:spPr/>
-        <p:txBody>
-          <a:bodyPr/>
-          <a:lstStyle/>
-          <a:p>
-            <a:endParaRPr lang="en-US"/>
-          </a:p>
-        </p:txBody>
-      </p:sp>
+        </p:nvPicPr>
+        <p:blipFill>
+          <a:blip r:embed="rId3"/>
+          <a:stretch>
+            <a:fillRect/>
+          </a:stretch>
+        </p:blipFill>
+        <p:spPr>
+          <a:xfrm>
+            <a:off x="1199252" y="1868654"/>
+            <a:ext cx="5252838" cy="4351338"/>
+          </a:xfrm>
+          <a:prstGeom prst="rect">
+            <a:avLst/>
+          </a:prstGeom>
+        </p:spPr>
+      </p:pic>
     </p:spTree>
     <p:extLst>
       <p:ext uri="{BB962C8B-B14F-4D97-AF65-F5344CB8AC3E}">
-        <p14:creationId xmlns:p14="http://schemas.microsoft.com/office/powerpoint/2010/main" val="1779687266"/>
+        <p14:creationId xmlns:p14="http://schemas.microsoft.com/office/powerpoint/2010/main" val="3647413860"/>
       </p:ext>
     </p:extLst>
   </p:cSld>
@@ -3871,7 +4223,7 @@
           <p:cNvPr id="2" name="Title 1">
             <a:extLst>
               <a:ext uri="{FF2B5EF4-FFF2-40B4-BE49-F238E27FC236}">
-                <a16:creationId xmlns:a16="http://schemas.microsoft.com/office/drawing/2014/main" id="{1E4554C1-96E8-4A2A-B137-9F6884180044}"/>
+                <a16:creationId xmlns:a16="http://schemas.microsoft.com/office/drawing/2014/main" id="{06B9D043-BB24-4054-9A3D-590DC478D9B8}"/>
               </a:ext>
             </a:extLst>
           </p:cNvPr>
@@ -3889,7 +4241,7 @@
           <a:p>
             <a:r>
               <a:rPr lang="en-US" dirty="0"/>
-              <a:t>Insight</a:t>
+              <a:t>Objective</a:t>
             </a:r>
           </a:p>
         </p:txBody>
@@ -3899,7 +4251,7 @@
           <p:cNvPr id="3" name="Content Placeholder 2">
             <a:extLst>
               <a:ext uri="{FF2B5EF4-FFF2-40B4-BE49-F238E27FC236}">
-                <a16:creationId xmlns:a16="http://schemas.microsoft.com/office/drawing/2014/main" id="{94747F63-187D-41B6-9326-E38CB280DBF7}"/>
+                <a16:creationId xmlns:a16="http://schemas.microsoft.com/office/drawing/2014/main" id="{BDC88E67-ADE4-4701-A462-6DAA60BAF5AF}"/>
               </a:ext>
             </a:extLst>
           </p:cNvPr>
@@ -3915,14 +4267,14 @@
           <a:bodyPr/>
           <a:lstStyle/>
           <a:p>
-            <a:endParaRPr lang="en-US"/>
+            <a:endParaRPr lang="en-US" dirty="0"/>
           </a:p>
         </p:txBody>
       </p:sp>
     </p:spTree>
     <p:extLst>
       <p:ext uri="{BB962C8B-B14F-4D97-AF65-F5344CB8AC3E}">
-        <p14:creationId xmlns:p14="http://schemas.microsoft.com/office/powerpoint/2010/main" val="2035202849"/>
+        <p14:creationId xmlns:p14="http://schemas.microsoft.com/office/powerpoint/2010/main" val="79547047"/>
       </p:ext>
     </p:extLst>
   </p:cSld>
@@ -3954,7 +4306,7 @@
           <p:cNvPr id="2" name="Title 1">
             <a:extLst>
               <a:ext uri="{FF2B5EF4-FFF2-40B4-BE49-F238E27FC236}">
-                <a16:creationId xmlns:a16="http://schemas.microsoft.com/office/drawing/2014/main" id="{D3DC9130-32FE-4473-8258-B7AD8A8C3522}"/>
+                <a16:creationId xmlns:a16="http://schemas.microsoft.com/office/drawing/2014/main" id="{6953608A-7531-4E0C-A2B3-4F02DC33E0BC}"/>
               </a:ext>
             </a:extLst>
           </p:cNvPr>
@@ -3972,7 +4324,7 @@
           <a:p>
             <a:r>
               <a:rPr lang="en-US" dirty="0"/>
-              <a:t>Future work</a:t>
+              <a:t>Results</a:t>
             </a:r>
           </a:p>
         </p:txBody>
@@ -3982,7 +4334,7 @@
           <p:cNvPr id="3" name="Content Placeholder 2">
             <a:extLst>
               <a:ext uri="{FF2B5EF4-FFF2-40B4-BE49-F238E27FC236}">
-                <a16:creationId xmlns:a16="http://schemas.microsoft.com/office/drawing/2014/main" id="{4AFE224A-947E-49DD-8556-0AF61919895B}"/>
+                <a16:creationId xmlns:a16="http://schemas.microsoft.com/office/drawing/2014/main" id="{BDDAF977-B0AC-4872-A4EB-B595C2AFF5C8}"/>
               </a:ext>
             </a:extLst>
           </p:cNvPr>
@@ -3998,14 +4350,14 @@
           <a:bodyPr/>
           <a:lstStyle/>
           <a:p>
-            <a:endParaRPr lang="en-US" dirty="0"/>
+            <a:endParaRPr lang="en-US"/>
           </a:p>
         </p:txBody>
       </p:sp>
     </p:spTree>
     <p:extLst>
       <p:ext uri="{BB962C8B-B14F-4D97-AF65-F5344CB8AC3E}">
-        <p14:creationId xmlns:p14="http://schemas.microsoft.com/office/powerpoint/2010/main" val="183809477"/>
+        <p14:creationId xmlns:p14="http://schemas.microsoft.com/office/powerpoint/2010/main" val="1779687266"/>
       </p:ext>
     </p:extLst>
   </p:cSld>
@@ -4037,7 +4389,7 @@
           <p:cNvPr id="2" name="Title 1">
             <a:extLst>
               <a:ext uri="{FF2B5EF4-FFF2-40B4-BE49-F238E27FC236}">
-                <a16:creationId xmlns:a16="http://schemas.microsoft.com/office/drawing/2014/main" id="{A2F36CEB-8222-4660-B66A-DFA2212BCEAC}"/>
+                <a16:creationId xmlns:a16="http://schemas.microsoft.com/office/drawing/2014/main" id="{1E4554C1-96E8-4A2A-B137-9F6884180044}"/>
               </a:ext>
             </a:extLst>
           </p:cNvPr>
@@ -4055,7 +4407,7 @@
           <a:p>
             <a:r>
               <a:rPr lang="en-US" dirty="0"/>
-              <a:t>References</a:t>
+              <a:t>Insight</a:t>
             </a:r>
           </a:p>
         </p:txBody>
@@ -4065,7 +4417,7 @@
           <p:cNvPr id="3" name="Content Placeholder 2">
             <a:extLst>
               <a:ext uri="{FF2B5EF4-FFF2-40B4-BE49-F238E27FC236}">
-                <a16:creationId xmlns:a16="http://schemas.microsoft.com/office/drawing/2014/main" id="{584EB1ED-BE34-414A-BBB6-1EB858E56703}"/>
+                <a16:creationId xmlns:a16="http://schemas.microsoft.com/office/drawing/2014/main" id="{94747F63-187D-41B6-9326-E38CB280DBF7}"/>
               </a:ext>
             </a:extLst>
           </p:cNvPr>
@@ -4081,83 +4433,100 @@
           <a:bodyPr/>
           <a:lstStyle/>
           <a:p>
-            <a:r>
-              <a:rPr lang="en-US" sz="1400" dirty="0"/>
-              <a:t>IATA Forecast Predicts 8.2 billion Air Travelers in 2037 </a:t>
-            </a:r>
-            <a:r>
-              <a:rPr lang="en-US" sz="1400" dirty="0">
-                <a:hlinkClick r:id="rId2"/>
-              </a:rPr>
-              <a:t>https://www.iata.org/pressroom/pr/Pages/2018-10-24-02.aspx</a:t>
-            </a:r>
-            <a:r>
-              <a:rPr lang="en-US" sz="1400" dirty="0"/>
-              <a:t> </a:t>
-            </a:r>
-            <a:r>
-              <a:rPr lang="en-US" sz="1400" dirty="0">
-                <a:hlinkClick r:id="rId3" action="ppaction://hlinksldjump"/>
-              </a:rPr>
-              <a:t>[1]</a:t>
-            </a:r>
-            <a:endParaRPr lang="en-US" sz="1400" dirty="0"/>
-          </a:p>
-          <a:p>
-            <a:r>
-              <a:rPr lang="en-US" sz="1400" dirty="0"/>
-              <a:t>Annual U.S. Impact of Flight Delays (NEXTOR report) </a:t>
-            </a:r>
-            <a:r>
-              <a:rPr lang="en-US" sz="1400" dirty="0">
-                <a:hlinkClick r:id="rId4"/>
-              </a:rPr>
-              <a:t>http://airlines.org/data/annual-u-s-impact-of-flight-delays-nextor-report/</a:t>
-            </a:r>
-            <a:r>
-              <a:rPr lang="en-US" sz="1400" dirty="0"/>
-              <a:t> </a:t>
-            </a:r>
-            <a:r>
-              <a:rPr lang="en-US" sz="1400" dirty="0">
-                <a:hlinkClick r:id="rId3" action="ppaction://hlinksldjump"/>
-              </a:rPr>
-              <a:t>[2]</a:t>
-            </a:r>
-            <a:endParaRPr lang="en-US" sz="1400" dirty="0"/>
-          </a:p>
-          <a:p>
-            <a:r>
-              <a:rPr lang="en-US" sz="1400" dirty="0"/>
-              <a:t>Holidaymakers 'waste 16 days waiting in airports over lifetime </a:t>
-            </a:r>
-            <a:r>
-              <a:rPr lang="en-US" sz="1400" dirty="0">
-                <a:hlinkClick r:id="rId5"/>
-              </a:rPr>
-              <a:t>https://www.telegraph.co.uk/travel/travelnews/7546209/Holidaymakers-waste-16-days-waiting-in-airports-over-lifetime.html</a:t>
-            </a:r>
-            <a:r>
-              <a:rPr lang="en-US" sz="1400" dirty="0"/>
-              <a:t> </a:t>
-            </a:r>
-            <a:r>
-              <a:rPr lang="en-US" sz="1400" dirty="0">
-                <a:hlinkClick r:id="rId3" action="ppaction://hlinksldjump"/>
-              </a:rPr>
-              <a:t>[3]</a:t>
-            </a:r>
-            <a:endParaRPr lang="en-US" sz="1400" dirty="0"/>
-          </a:p>
-          <a:p>
-            <a:endParaRPr lang="en-US" dirty="0"/>
+            <a:endParaRPr lang="en-US"/>
           </a:p>
         </p:txBody>
       </p:sp>
     </p:spTree>
     <p:extLst>
       <p:ext uri="{BB962C8B-B14F-4D97-AF65-F5344CB8AC3E}">
-        <p14:creationId xmlns:p14="http://schemas.microsoft.com/office/powerpoint/2010/main" val="3998683983"/>
+        <p14:creationId xmlns:p14="http://schemas.microsoft.com/office/powerpoint/2010/main" val="2035202849"/>
+      </p:ext>
+    </p:extLst>
+  </p:cSld>
+  <p:clrMapOvr>
+    <a:masterClrMapping/>
+  </p:clrMapOvr>
+</p:sld>
+</file>
+
+<file path=ppt/slides/slide9.xml><?xml version="1.0" encoding="utf-8"?>
+<p:sld xmlns:a="http://schemas.openxmlformats.org/drawingml/2006/main" xmlns:r="http://schemas.openxmlformats.org/officeDocument/2006/relationships" xmlns:p="http://schemas.openxmlformats.org/presentationml/2006/main">
+  <p:cSld>
+    <p:spTree>
+      <p:nvGrpSpPr>
+        <p:cNvPr id="1" name=""/>
+        <p:cNvGrpSpPr/>
+        <p:nvPr/>
+      </p:nvGrpSpPr>
+      <p:grpSpPr>
+        <a:xfrm>
+          <a:off x="0" y="0"/>
+          <a:ext cx="0" cy="0"/>
+          <a:chOff x="0" y="0"/>
+          <a:chExt cx="0" cy="0"/>
+        </a:xfrm>
+      </p:grpSpPr>
+      <p:sp>
+        <p:nvSpPr>
+          <p:cNvPr id="2" name="Title 1">
+            <a:extLst>
+              <a:ext uri="{FF2B5EF4-FFF2-40B4-BE49-F238E27FC236}">
+                <a16:creationId xmlns:a16="http://schemas.microsoft.com/office/drawing/2014/main" id="{D3DC9130-32FE-4473-8258-B7AD8A8C3522}"/>
+              </a:ext>
+            </a:extLst>
+          </p:cNvPr>
+          <p:cNvSpPr>
+            <a:spLocks noGrp="1"/>
+          </p:cNvSpPr>
+          <p:nvPr>
+            <p:ph type="title"/>
+          </p:nvPr>
+        </p:nvSpPr>
+        <p:spPr/>
+        <p:txBody>
+          <a:bodyPr/>
+          <a:lstStyle/>
+          <a:p>
+            <a:r>
+              <a:rPr lang="en-US" dirty="0"/>
+              <a:t>Future work</a:t>
+            </a:r>
+          </a:p>
+        </p:txBody>
+      </p:sp>
+      <p:sp>
+        <p:nvSpPr>
+          <p:cNvPr id="3" name="Content Placeholder 2">
+            <a:extLst>
+              <a:ext uri="{FF2B5EF4-FFF2-40B4-BE49-F238E27FC236}">
+                <a16:creationId xmlns:a16="http://schemas.microsoft.com/office/drawing/2014/main" id="{4AFE224A-947E-49DD-8556-0AF61919895B}"/>
+              </a:ext>
+            </a:extLst>
+          </p:cNvPr>
+          <p:cNvSpPr>
+            <a:spLocks noGrp="1"/>
+          </p:cNvSpPr>
+          <p:nvPr>
+            <p:ph idx="1"/>
+          </p:nvPr>
+        </p:nvSpPr>
+        <p:spPr/>
+        <p:txBody>
+          <a:bodyPr/>
+          <a:lstStyle/>
+          <a:p>
+            <a:r>
+              <a:rPr lang="en-US" dirty="0"/>
+              <a:t>We want to add more interactive visualizations to allow users to select airports and airlines.</a:t>
+            </a:r>
+          </a:p>
+        </p:txBody>
+      </p:sp>
+    </p:spTree>
+    <p:extLst>
+      <p:ext uri="{BB962C8B-B14F-4D97-AF65-F5344CB8AC3E}">
+        <p14:creationId xmlns:p14="http://schemas.microsoft.com/office/powerpoint/2010/main" val="183809477"/>
       </p:ext>
     </p:extLst>
   </p:cSld>

</xml_diff>